<commit_message>
:bento: Update merge sort process asset
</commit_message>
<xml_diff>
--- a/12/yongki/Sorting.pptx
+++ b/12/yongki/Sorting.pptx
@@ -250,7 +250,7 @@
           <a:p>
             <a:fld id="{278A5395-7299-4714-9E5C-8983F2B9A6E7}" type="datetimeFigureOut">
               <a:rPr lang="ko-KR" altLang="en-US" smtClean="0"/>
-              <a:t>2022-06-09</a:t>
+              <a:t>2022-06-10</a:t>
             </a:fld>
             <a:endParaRPr lang="ko-KR" altLang="en-US"/>
           </a:p>
@@ -6343,52 +6343,6 @@
           </a:graphicData>
         </a:graphic>
       </p:graphicFrame>
-      <p:cxnSp>
-        <p:nvCxnSpPr>
-          <p:cNvPr id="21" name="직선 화살표 연결선 20">
-            <a:extLst>
-              <a:ext uri="{FF2B5EF4-FFF2-40B4-BE49-F238E27FC236}">
-                <a16:creationId xmlns:a16="http://schemas.microsoft.com/office/drawing/2014/main" id="{AEB2E4E1-C1E5-9068-9025-7D3ECB22BC54}"/>
-              </a:ext>
-            </a:extLst>
-          </p:cNvPr>
-          <p:cNvCxnSpPr/>
-          <p:nvPr/>
-        </p:nvCxnSpPr>
-        <p:spPr bwMode="auto">
-          <a:xfrm>
-            <a:off x="1691680" y="2703513"/>
-            <a:ext cx="0" cy="367870"/>
-          </a:xfrm>
-          <a:prstGeom prst="straightConnector1">
-            <a:avLst/>
-          </a:prstGeom>
-          <a:solidFill>
-            <a:schemeClr val="accent1"/>
-          </a:solidFill>
-          <a:ln w="9525" cap="flat" cmpd="sng" algn="ctr">
-            <a:solidFill>
-              <a:schemeClr val="tx1"/>
-            </a:solidFill>
-            <a:prstDash val="solid"/>
-            <a:round/>
-            <a:headEnd type="none" w="med" len="med"/>
-            <a:tailEnd type="triangle"/>
-          </a:ln>
-          <a:effectLst/>
-          <a:extLst>
-            <a:ext uri="{AF507438-7753-43E0-B8FC-AC1667EBCBE1}">
-              <a14:hiddenEffects xmlns:a14="http://schemas.microsoft.com/office/drawing/2010/main">
-                <a:effectLst>
-                  <a:outerShdw dist="35921" dir="2700000" algn="ctr" rotWithShape="0">
-                    <a:schemeClr val="bg2"/>
-                  </a:outerShdw>
-                </a:effectLst>
-              </a14:hiddenEffects>
-            </a:ext>
-          </a:extLst>
-        </p:spPr>
-      </p:cxnSp>
       <p:graphicFrame>
         <p:nvGraphicFramePr>
           <p:cNvPr id="9" name="표 8">
@@ -13902,36 +13856,6 @@
           </a:extLst>
         </p:spPr>
       </p:cxnSp>
-      <p:pic>
-        <p:nvPicPr>
-          <p:cNvPr id="4" name="그림 3">
-            <a:extLst>
-              <a:ext uri="{FF2B5EF4-FFF2-40B4-BE49-F238E27FC236}">
-                <a16:creationId xmlns:a16="http://schemas.microsoft.com/office/drawing/2014/main" id="{532D8E1F-1401-F363-9CFF-88EA05DE0E09}"/>
-              </a:ext>
-            </a:extLst>
-          </p:cNvPr>
-          <p:cNvPicPr>
-            <a:picLocks noChangeAspect="1"/>
-          </p:cNvPicPr>
-          <p:nvPr/>
-        </p:nvPicPr>
-        <p:blipFill>
-          <a:blip r:embed="rId2"/>
-          <a:stretch>
-            <a:fillRect/>
-          </a:stretch>
-        </p:blipFill>
-        <p:spPr>
-          <a:xfrm>
-            <a:off x="4860032" y="2852936"/>
-            <a:ext cx="3528392" cy="3727455"/>
-          </a:xfrm>
-          <a:prstGeom prst="rect">
-            <a:avLst/>
-          </a:prstGeom>
-        </p:spPr>
-      </p:pic>
       <p:graphicFrame>
         <p:nvGraphicFramePr>
           <p:cNvPr id="9" name="표 8">
@@ -15059,7 +14983,7 @@
           <p:nvPr/>
         </p:nvPicPr>
         <p:blipFill>
-          <a:blip r:embed="rId3"/>
+          <a:blip r:embed="rId2"/>
           <a:stretch>
             <a:fillRect/>
           </a:stretch>
@@ -15068,6 +14992,42 @@
           <a:xfrm>
             <a:off x="806859" y="2801871"/>
             <a:ext cx="3477110" cy="3829584"/>
+          </a:xfrm>
+          <a:prstGeom prst="rect">
+            <a:avLst/>
+          </a:prstGeom>
+        </p:spPr>
+      </p:pic>
+      <p:pic>
+        <p:nvPicPr>
+          <p:cNvPr id="5" name="그림 4">
+            <a:extLst>
+              <a:ext uri="{FF2B5EF4-FFF2-40B4-BE49-F238E27FC236}">
+                <a16:creationId xmlns:a16="http://schemas.microsoft.com/office/drawing/2014/main" id="{5658D9D6-A306-9ADB-FAEB-68FC7064B6A9}"/>
+              </a:ext>
+            </a:extLst>
+          </p:cNvPr>
+          <p:cNvPicPr>
+            <a:picLocks noChangeAspect="1"/>
+          </p:cNvPicPr>
+          <p:nvPr/>
+        </p:nvPicPr>
+        <p:blipFill>
+          <a:blip r:embed="rId3">
+            <a:extLst>
+              <a:ext uri="{28A0092B-C50C-407E-A947-70E740481C1C}">
+                <a14:useLocalDpi xmlns:a14="http://schemas.microsoft.com/office/drawing/2010/main" val="0"/>
+              </a:ext>
+            </a:extLst>
+          </a:blip>
+          <a:stretch>
+            <a:fillRect/>
+          </a:stretch>
+        </p:blipFill>
+        <p:spPr>
+          <a:xfrm>
+            <a:off x="4932040" y="2801871"/>
+            <a:ext cx="3251990" cy="3954363"/>
           </a:xfrm>
           <a:prstGeom prst="rect">
             <a:avLst/>

</xml_diff>